<commit_message>
presentation and html updates
</commit_message>
<xml_diff>
--- a/Presentation/03_Project_Dirty_Dogs_Presentation.pptx
+++ b/Presentation/03_Project_Dirty_Dogs_Presentation.pptx
@@ -4710,7 +4710,21 @@
                 <a:latin typeface="Raavi" panose="020B0502040204020203" pitchFamily="34" charset="0"/>
                 <a:cs typeface="Raavi" panose="020B0502040204020203" pitchFamily="34" charset="0"/>
               </a:rPr>
-              <a:t>: Pretrained Stanford Model</a:t>
+              <a:t>: Stanford Dataset (</a:t>
+            </a:r>
+            <a:r>
+              <a:rPr lang="en-US" sz="2800" dirty="0" err="1">
+                <a:latin typeface="Raavi" panose="020B0502040204020203" pitchFamily="34" charset="0"/>
+                <a:cs typeface="Raavi" panose="020B0502040204020203" pitchFamily="34" charset="0"/>
+              </a:rPr>
+              <a:t>Xception</a:t>
+            </a:r>
+            <a:r>
+              <a:rPr lang="en-US" sz="2800" dirty="0">
+                <a:latin typeface="Raavi" panose="020B0502040204020203" pitchFamily="34" charset="0"/>
+                <a:cs typeface="Raavi" panose="020B0502040204020203" pitchFamily="34" charset="0"/>
+              </a:rPr>
+              <a:t>)</a:t>
             </a:r>
           </a:p>
           <a:p>

</xml_diff>